<commit_message>
Bad and Good created
</commit_message>
<xml_diff>
--- a/Powerpoint/SOLID_S.pptx
+++ b/Powerpoint/SOLID_S.pptx
@@ -5,16 +5,18 @@
     <p:sldMasterId id="2147483762" r:id="rId1"/>
   </p:sldMasterIdLst>
   <p:handoutMasterIdLst>
-    <p:handoutMasterId r:id="rId9"/>
+    <p:handoutMasterId r:id="rId11"/>
   </p:handoutMasterIdLst>
   <p:sldIdLst>
     <p:sldId id="256" r:id="rId2"/>
     <p:sldId id="262" r:id="rId3"/>
     <p:sldId id="257" r:id="rId4"/>
-    <p:sldId id="258" r:id="rId5"/>
-    <p:sldId id="259" r:id="rId6"/>
-    <p:sldId id="260" r:id="rId7"/>
-    <p:sldId id="261" r:id="rId8"/>
+    <p:sldId id="263" r:id="rId5"/>
+    <p:sldId id="264" r:id="rId6"/>
+    <p:sldId id="258" r:id="rId7"/>
+    <p:sldId id="259" r:id="rId8"/>
+    <p:sldId id="260" r:id="rId9"/>
+    <p:sldId id="261" r:id="rId10"/>
   </p:sldIdLst>
   <p:sldSz cx="12192000" cy="6858000"/>
   <p:notesSz cx="6858000" cy="9144000"/>
@@ -6420,7 +6422,7 @@
           <a:p>
             <a:r>
               <a:rPr lang="ru-RU" b="1" dirty="0"/>
-              <a:t>Принцип открытости/закрытости</a:t>
+              <a:t>Принцип единственной ответственности</a:t>
             </a:r>
             <a:r>
               <a:rPr lang="en-US" b="1" dirty="0"/>
@@ -6431,7 +6433,7 @@
             </a:br>
             <a:r>
               <a:rPr lang="en-US" sz="3200" i="1" dirty="0"/>
-              <a:t>The Open Closed Principle</a:t>
+              <a:t>The Single Responsibility Principle</a:t>
             </a:r>
             <a:endParaRPr lang="en-US" dirty="0"/>
           </a:p>
@@ -6439,10 +6441,10 @@
       </p:sp>
       <p:sp>
         <p:nvSpPr>
-          <p:cNvPr id="3" name="TextBox 2">
+          <p:cNvPr id="15" name="TextBox 14">
             <a:extLst>
               <a:ext uri="{FF2B5EF4-FFF2-40B4-BE49-F238E27FC236}">
-                <a16:creationId xmlns:a16="http://schemas.microsoft.com/office/drawing/2014/main" id="{0449A707-99AE-4210-AF89-4A9F25E03165}"/>
+                <a16:creationId xmlns:a16="http://schemas.microsoft.com/office/drawing/2014/main" id="{101A60AD-0F18-481A-96EA-970C064E5E5F}"/>
               </a:ext>
             </a:extLst>
           </p:cNvPr>
@@ -6451,8 +6453,8 @@
         </p:nvSpPr>
         <p:spPr>
           <a:xfrm>
-            <a:off x="576263" y="2233613"/>
-            <a:ext cx="9836982" cy="2616101"/>
+            <a:off x="576263" y="3101831"/>
+            <a:ext cx="9836982" cy="830997"/>
           </a:xfrm>
           <a:prstGeom prst="rect">
             <a:avLst/>
@@ -6460,68 +6462,32 @@
           <a:noFill/>
         </p:spPr>
         <p:txBody>
-          <a:bodyPr wrap="square" rtlCol="0">
+          <a:bodyPr wrap="square" rtlCol="0" anchor="ctr">
             <a:spAutoFit/>
           </a:bodyPr>
           <a:lstStyle/>
           <a:p>
-            <a:r>
-              <a:rPr lang="ru-RU" sz="2800" dirty="0">
+            <a:pPr algn="ctr"/>
+            <a:r>
+              <a:rPr lang="ru-RU" sz="4800" dirty="0" smtClean="0">
                 <a:solidFill>
                   <a:srgbClr val="FFFF00"/>
                 </a:solidFill>
               </a:rPr>
-              <a:t>Программные сущности должны быть открыты для расширения, но закрыты для модификации.</a:t>
-            </a:r>
-          </a:p>
-          <a:p>
-            <a:endParaRPr lang="ru-RU" sz="2800" dirty="0"/>
-          </a:p>
-          <a:p>
-            <a:r>
-              <a:rPr lang="ru-RU" sz="2000" dirty="0"/>
-              <a:t>Принцип открытости/закрытости (англ. </a:t>
-            </a:r>
-            <a:r>
-              <a:rPr lang="ru-RU" sz="2000" dirty="0" err="1"/>
-              <a:t>The</a:t>
-            </a:r>
-            <a:r>
-              <a:rPr lang="ru-RU" sz="2000" dirty="0"/>
-              <a:t> </a:t>
-            </a:r>
-            <a:r>
-              <a:rPr lang="ru-RU" sz="2000" dirty="0" err="1"/>
-              <a:t>Open</a:t>
-            </a:r>
-            <a:r>
-              <a:rPr lang="ru-RU" sz="2000" dirty="0"/>
-              <a:t> </a:t>
-            </a:r>
-            <a:r>
-              <a:rPr lang="ru-RU" sz="2000" dirty="0" err="1"/>
-              <a:t>Closed</a:t>
-            </a:r>
-            <a:r>
-              <a:rPr lang="ru-RU" sz="2000" dirty="0"/>
-              <a:t> </a:t>
-            </a:r>
-            <a:r>
-              <a:rPr lang="ru-RU" sz="2000" dirty="0" err="1"/>
-              <a:t>Principle</a:t>
-            </a:r>
-            <a:r>
-              <a:rPr lang="ru-RU" sz="2000" dirty="0"/>
-              <a:t>, OCP) — принцип ООП, устанавливающий следующее положение: «программные сущности (классы, модули, функции и т. п.) должны быть открыты для расширения, но закрыты для изменения.</a:t>
-            </a:r>
-            <a:endParaRPr lang="en-US" sz="2000" dirty="0"/>
+              <a:t>Демонстрация</a:t>
+            </a:r>
+            <a:endParaRPr lang="ru-RU" sz="4800" dirty="0">
+              <a:solidFill>
+                <a:srgbClr val="FFFF00"/>
+              </a:solidFill>
+            </a:endParaRPr>
           </a:p>
         </p:txBody>
       </p:sp>
     </p:spTree>
     <p:extLst>
       <p:ext uri="{BB962C8B-B14F-4D97-AF65-F5344CB8AC3E}">
-        <p14:creationId xmlns:p14="http://schemas.microsoft.com/office/powerpoint/2010/main" val="2724221835"/>
+        <p14:creationId xmlns:p14="http://schemas.microsoft.com/office/powerpoint/2010/main" val="341898640"/>
       </p:ext>
     </p:extLst>
   </p:cSld>
@@ -6531,6 +6497,13 @@
   <p:transition spd="slow">
     <p:cover/>
   </p:transition>
+  <p:timing>
+    <p:tnLst>
+      <p:par>
+        <p:cTn id="1" dur="indefinite" restart="never" nodeType="tmRoot"/>
+      </p:par>
+    </p:tnLst>
+  </p:timing>
 </p:sld>
 </file>
 
@@ -6576,6 +6549,280 @@
           <a:p>
             <a:r>
               <a:rPr lang="ru-RU" b="1" dirty="0"/>
+              <a:t>Принцип единственной ответственности</a:t>
+            </a:r>
+            <a:r>
+              <a:rPr lang="en-US" b="1" dirty="0"/>
+              <a:t/>
+            </a:r>
+            <a:br>
+              <a:rPr lang="en-US" b="1" dirty="0"/>
+            </a:br>
+            <a:r>
+              <a:rPr lang="en-US" sz="3200" i="1" dirty="0"/>
+              <a:t>The Single Responsibility Principle</a:t>
+            </a:r>
+            <a:endParaRPr lang="en-US" dirty="0"/>
+          </a:p>
+        </p:txBody>
+      </p:sp>
+      <p:sp>
+        <p:nvSpPr>
+          <p:cNvPr id="5" name="TextBox 4">
+            <a:extLst>
+              <a:ext uri="{FF2B5EF4-FFF2-40B4-BE49-F238E27FC236}">
+                <a16:creationId xmlns:a16="http://schemas.microsoft.com/office/drawing/2014/main" id="{101A60AD-0F18-481A-96EA-970C064E5E5F}"/>
+              </a:ext>
+            </a:extLst>
+          </p:cNvPr>
+          <p:cNvSpPr txBox="1"/>
+          <p:nvPr/>
+        </p:nvSpPr>
+        <p:spPr>
+          <a:xfrm>
+            <a:off x="680320" y="2239811"/>
+            <a:ext cx="9756771" cy="1077218"/>
+          </a:xfrm>
+          <a:prstGeom prst="rect">
+            <a:avLst/>
+          </a:prstGeom>
+          <a:noFill/>
+        </p:spPr>
+        <p:txBody>
+          <a:bodyPr wrap="square" rtlCol="0" anchor="ctr">
+            <a:spAutoFit/>
+          </a:bodyPr>
+          <a:lstStyle/>
+          <a:p>
+            <a:r>
+              <a:rPr lang="ru-RU" sz="3200" dirty="0"/>
+              <a:t>Архитектура приложений: концептуальные слои и договоренности по их использованию</a:t>
+            </a:r>
+            <a:endParaRPr lang="ru-RU" sz="3200" dirty="0"/>
+          </a:p>
+        </p:txBody>
+      </p:sp>
+    </p:spTree>
+    <p:extLst>
+      <p:ext uri="{BB962C8B-B14F-4D97-AF65-F5344CB8AC3E}">
+        <p14:creationId xmlns:p14="http://schemas.microsoft.com/office/powerpoint/2010/main" val="2629252122"/>
+      </p:ext>
+    </p:extLst>
+  </p:cSld>
+  <p:clrMapOvr>
+    <a:masterClrMapping/>
+  </p:clrMapOvr>
+  <p:transition spd="slow">
+    <p:cover/>
+  </p:transition>
+  <p:timing>
+    <p:tnLst>
+      <p:par>
+        <p:cTn id="1" dur="indefinite" restart="never" nodeType="tmRoot"/>
+      </p:par>
+    </p:tnLst>
+  </p:timing>
+</p:sld>
+</file>
+
+<file path=ppt/slides/slide6.xml><?xml version="1.0" encoding="utf-8"?>
+<p:sld xmlns:a="http://schemas.openxmlformats.org/drawingml/2006/main" xmlns:r="http://schemas.openxmlformats.org/officeDocument/2006/relationships" xmlns:p="http://schemas.openxmlformats.org/presentationml/2006/main">
+  <p:cSld>
+    <p:spTree>
+      <p:nvGrpSpPr>
+        <p:cNvPr id="1" name=""/>
+        <p:cNvGrpSpPr/>
+        <p:nvPr/>
+      </p:nvGrpSpPr>
+      <p:grpSpPr>
+        <a:xfrm>
+          <a:off x="0" y="0"/>
+          <a:ext cx="0" cy="0"/>
+          <a:chOff x="0" y="0"/>
+          <a:chExt cx="0" cy="0"/>
+        </a:xfrm>
+      </p:grpSpPr>
+      <p:sp>
+        <p:nvSpPr>
+          <p:cNvPr id="4" name="Заголовок 3">
+            <a:extLst>
+              <a:ext uri="{FF2B5EF4-FFF2-40B4-BE49-F238E27FC236}">
+                <a16:creationId xmlns:a16="http://schemas.microsoft.com/office/drawing/2014/main" id="{56B210DD-3C70-4225-BAC0-26F0709D6072}"/>
+              </a:ext>
+            </a:extLst>
+          </p:cNvPr>
+          <p:cNvSpPr>
+            <a:spLocks noGrp="1"/>
+          </p:cNvSpPr>
+          <p:nvPr>
+            <p:ph type="title"/>
+          </p:nvPr>
+        </p:nvSpPr>
+        <p:spPr/>
+        <p:txBody>
+          <a:bodyPr>
+            <a:normAutofit/>
+          </a:bodyPr>
+          <a:lstStyle/>
+          <a:p>
+            <a:r>
+              <a:rPr lang="ru-RU" b="1" dirty="0"/>
+              <a:t>Принцип открытости/закрытости</a:t>
+            </a:r>
+            <a:r>
+              <a:rPr lang="en-US" b="1" dirty="0"/>
+              <a:t/>
+            </a:r>
+            <a:br>
+              <a:rPr lang="en-US" b="1" dirty="0"/>
+            </a:br>
+            <a:r>
+              <a:rPr lang="en-US" sz="3200" i="1" dirty="0"/>
+              <a:t>The Open Closed Principle</a:t>
+            </a:r>
+            <a:endParaRPr lang="en-US" dirty="0"/>
+          </a:p>
+        </p:txBody>
+      </p:sp>
+      <p:sp>
+        <p:nvSpPr>
+          <p:cNvPr id="3" name="TextBox 2">
+            <a:extLst>
+              <a:ext uri="{FF2B5EF4-FFF2-40B4-BE49-F238E27FC236}">
+                <a16:creationId xmlns:a16="http://schemas.microsoft.com/office/drawing/2014/main" id="{0449A707-99AE-4210-AF89-4A9F25E03165}"/>
+              </a:ext>
+            </a:extLst>
+          </p:cNvPr>
+          <p:cNvSpPr txBox="1"/>
+          <p:nvPr/>
+        </p:nvSpPr>
+        <p:spPr>
+          <a:xfrm>
+            <a:off x="576263" y="2233613"/>
+            <a:ext cx="9836982" cy="2616101"/>
+          </a:xfrm>
+          <a:prstGeom prst="rect">
+            <a:avLst/>
+          </a:prstGeom>
+          <a:noFill/>
+        </p:spPr>
+        <p:txBody>
+          <a:bodyPr wrap="square" rtlCol="0">
+            <a:spAutoFit/>
+          </a:bodyPr>
+          <a:lstStyle/>
+          <a:p>
+            <a:r>
+              <a:rPr lang="ru-RU" sz="2800" dirty="0">
+                <a:solidFill>
+                  <a:srgbClr val="FFFF00"/>
+                </a:solidFill>
+              </a:rPr>
+              <a:t>Программные сущности должны быть открыты для расширения, но закрыты для модификации.</a:t>
+            </a:r>
+          </a:p>
+          <a:p>
+            <a:endParaRPr lang="ru-RU" sz="2800" dirty="0"/>
+          </a:p>
+          <a:p>
+            <a:r>
+              <a:rPr lang="ru-RU" sz="2000" dirty="0"/>
+              <a:t>Принцип открытости/закрытости (англ. </a:t>
+            </a:r>
+            <a:r>
+              <a:rPr lang="ru-RU" sz="2000" dirty="0" err="1"/>
+              <a:t>The</a:t>
+            </a:r>
+            <a:r>
+              <a:rPr lang="ru-RU" sz="2000" dirty="0"/>
+              <a:t> </a:t>
+            </a:r>
+            <a:r>
+              <a:rPr lang="ru-RU" sz="2000" dirty="0" err="1"/>
+              <a:t>Open</a:t>
+            </a:r>
+            <a:r>
+              <a:rPr lang="ru-RU" sz="2000" dirty="0"/>
+              <a:t> </a:t>
+            </a:r>
+            <a:r>
+              <a:rPr lang="ru-RU" sz="2000" dirty="0" err="1"/>
+              <a:t>Closed</a:t>
+            </a:r>
+            <a:r>
+              <a:rPr lang="ru-RU" sz="2000" dirty="0"/>
+              <a:t> </a:t>
+            </a:r>
+            <a:r>
+              <a:rPr lang="ru-RU" sz="2000" dirty="0" err="1"/>
+              <a:t>Principle</a:t>
+            </a:r>
+            <a:r>
+              <a:rPr lang="ru-RU" sz="2000" dirty="0"/>
+              <a:t>, OCP) — принцип ООП, устанавливающий следующее положение: «программные сущности (классы, модули, функции и т. п.) должны быть открыты для расширения, но закрыты для изменения.</a:t>
+            </a:r>
+            <a:endParaRPr lang="en-US" sz="2000" dirty="0"/>
+          </a:p>
+        </p:txBody>
+      </p:sp>
+    </p:spTree>
+    <p:extLst>
+      <p:ext uri="{BB962C8B-B14F-4D97-AF65-F5344CB8AC3E}">
+        <p14:creationId xmlns:p14="http://schemas.microsoft.com/office/powerpoint/2010/main" val="2724221835"/>
+      </p:ext>
+    </p:extLst>
+  </p:cSld>
+  <p:clrMapOvr>
+    <a:masterClrMapping/>
+  </p:clrMapOvr>
+  <p:transition spd="slow">
+    <p:cover/>
+  </p:transition>
+</p:sld>
+</file>
+
+<file path=ppt/slides/slide7.xml><?xml version="1.0" encoding="utf-8"?>
+<p:sld xmlns:a="http://schemas.openxmlformats.org/drawingml/2006/main" xmlns:r="http://schemas.openxmlformats.org/officeDocument/2006/relationships" xmlns:p="http://schemas.openxmlformats.org/presentationml/2006/main">
+  <p:cSld>
+    <p:spTree>
+      <p:nvGrpSpPr>
+        <p:cNvPr id="1" name=""/>
+        <p:cNvGrpSpPr/>
+        <p:nvPr/>
+      </p:nvGrpSpPr>
+      <p:grpSpPr>
+        <a:xfrm>
+          <a:off x="0" y="0"/>
+          <a:ext cx="0" cy="0"/>
+          <a:chOff x="0" y="0"/>
+          <a:chExt cx="0" cy="0"/>
+        </a:xfrm>
+      </p:grpSpPr>
+      <p:sp>
+        <p:nvSpPr>
+          <p:cNvPr id="4" name="Заголовок 3">
+            <a:extLst>
+              <a:ext uri="{FF2B5EF4-FFF2-40B4-BE49-F238E27FC236}">
+                <a16:creationId xmlns:a16="http://schemas.microsoft.com/office/drawing/2014/main" id="{56B210DD-3C70-4225-BAC0-26F0709D6072}"/>
+              </a:ext>
+            </a:extLst>
+          </p:cNvPr>
+          <p:cNvSpPr>
+            <a:spLocks noGrp="1"/>
+          </p:cNvSpPr>
+          <p:nvPr>
+            <p:ph type="title"/>
+          </p:nvPr>
+        </p:nvSpPr>
+        <p:spPr/>
+        <p:txBody>
+          <a:bodyPr>
+            <a:normAutofit/>
+          </a:bodyPr>
+          <a:lstStyle/>
+          <a:p>
+            <a:r>
+              <a:rPr lang="ru-RU" b="1" dirty="0"/>
               <a:t>Принцип подстановки Барбары Лисков</a:t>
             </a:r>
             <a:r>
@@ -6690,7 +6937,7 @@
 </p:sld>
 </file>
 
-<file path=ppt/slides/slide6.xml><?xml version="1.0" encoding="utf-8"?>
+<file path=ppt/slides/slide8.xml><?xml version="1.0" encoding="utf-8"?>
 <p:sld xmlns:a="http://schemas.openxmlformats.org/drawingml/2006/main" xmlns:r="http://schemas.openxmlformats.org/officeDocument/2006/relationships" xmlns:p="http://schemas.openxmlformats.org/presentationml/2006/main">
   <p:cSld>
     <p:spTree>
@@ -6845,7 +7092,7 @@
 </p:sld>
 </file>
 
-<file path=ppt/slides/slide7.xml><?xml version="1.0" encoding="utf-8"?>
+<file path=ppt/slides/slide9.xml><?xml version="1.0" encoding="utf-8"?>
 <p:sld xmlns:a="http://schemas.openxmlformats.org/drawingml/2006/main" xmlns:r="http://schemas.openxmlformats.org/officeDocument/2006/relationships" xmlns:p="http://schemas.openxmlformats.org/presentationml/2006/main">
   <p:cSld>
     <p:spTree>

</xml_diff>

<commit_message>
OCP demo as bad example created
</commit_message>
<xml_diff>
--- a/Powerpoint/SOLID_S.pptx
+++ b/Powerpoint/SOLID_S.pptx
@@ -5,10 +5,10 @@
     <p:sldMasterId id="2147483762" r:id="rId1"/>
   </p:sldMasterIdLst>
   <p:notesMasterIdLst>
-    <p:notesMasterId r:id="rId13"/>
+    <p:notesMasterId r:id="rId17"/>
   </p:notesMasterIdLst>
   <p:handoutMasterIdLst>
-    <p:handoutMasterId r:id="rId14"/>
+    <p:handoutMasterId r:id="rId18"/>
   </p:handoutMasterIdLst>
   <p:sldIdLst>
     <p:sldId id="256" r:id="rId2"/>
@@ -18,10 +18,14 @@
     <p:sldId id="257" r:id="rId6"/>
     <p:sldId id="263" r:id="rId7"/>
     <p:sldId id="264" r:id="rId8"/>
-    <p:sldId id="258" r:id="rId9"/>
-    <p:sldId id="259" r:id="rId10"/>
-    <p:sldId id="260" r:id="rId11"/>
-    <p:sldId id="261" r:id="rId12"/>
+    <p:sldId id="269" r:id="rId9"/>
+    <p:sldId id="258" r:id="rId10"/>
+    <p:sldId id="270" r:id="rId11"/>
+    <p:sldId id="267" r:id="rId12"/>
+    <p:sldId id="268" r:id="rId13"/>
+    <p:sldId id="259" r:id="rId14"/>
+    <p:sldId id="260" r:id="rId15"/>
+    <p:sldId id="261" r:id="rId16"/>
   </p:sldIdLst>
   <p:sldSz cx="12192000" cy="6858000"/>
   <p:notesSz cx="6858000" cy="9144000"/>
@@ -236,7 +240,7 @@
           <a:p>
             <a:fld id="{CDDF240B-3CA8-4045-B7C9-8B67F6FA2B5E}" type="datetimeFigureOut">
               <a:rPr lang="en-US" smtClean="0"/>
-              <a:t>2019-02-01</a:t>
+              <a:t>2019-02-17</a:t>
             </a:fld>
             <a:endParaRPr lang="en-US"/>
           </a:p>
@@ -401,7 +405,7 @@
           <a:p>
             <a:fld id="{8DB41A92-FFF7-46B1-92E3-CDB13879911B}" type="datetimeFigureOut">
               <a:rPr lang="en-US" smtClean="0"/>
-              <a:t>2019-02-01</a:t>
+              <a:t>2019-02-17</a:t>
             </a:fld>
             <a:endParaRPr lang="en-US"/>
           </a:p>
@@ -1005,6 +1009,90 @@
 </p:notes>
 </file>
 
+<file path=ppt/notesSlides/notesSlide5.xml><?xml version="1.0" encoding="utf-8"?>
+<p:notes xmlns:a="http://schemas.openxmlformats.org/drawingml/2006/main" xmlns:r="http://schemas.openxmlformats.org/officeDocument/2006/relationships" xmlns:p="http://schemas.openxmlformats.org/presentationml/2006/main">
+  <p:cSld>
+    <p:spTree>
+      <p:nvGrpSpPr>
+        <p:cNvPr id="1" name=""/>
+        <p:cNvGrpSpPr/>
+        <p:nvPr/>
+      </p:nvGrpSpPr>
+      <p:grpSpPr>
+        <a:xfrm>
+          <a:off x="0" y="0"/>
+          <a:ext cx="0" cy="0"/>
+          <a:chOff x="0" y="0"/>
+          <a:chExt cx="0" cy="0"/>
+        </a:xfrm>
+      </p:grpSpPr>
+      <p:sp>
+        <p:nvSpPr>
+          <p:cNvPr id="2" name="Образ слайда 1"/>
+          <p:cNvSpPr>
+            <a:spLocks noGrp="1" noRot="1" noChangeAspect="1"/>
+          </p:cNvSpPr>
+          <p:nvPr>
+            <p:ph type="sldImg"/>
+          </p:nvPr>
+        </p:nvSpPr>
+        <p:spPr/>
+      </p:sp>
+      <p:sp>
+        <p:nvSpPr>
+          <p:cNvPr id="3" name="Заметки 2"/>
+          <p:cNvSpPr>
+            <a:spLocks noGrp="1"/>
+          </p:cNvSpPr>
+          <p:nvPr>
+            <p:ph type="body" idx="1"/>
+          </p:nvPr>
+        </p:nvSpPr>
+        <p:spPr/>
+        <p:txBody>
+          <a:bodyPr/>
+          <a:lstStyle/>
+          <a:p>
+            <a:endParaRPr lang="en-US" dirty="0"/>
+          </a:p>
+        </p:txBody>
+      </p:sp>
+      <p:sp>
+        <p:nvSpPr>
+          <p:cNvPr id="4" name="Номер слайда 3"/>
+          <p:cNvSpPr>
+            <a:spLocks noGrp="1"/>
+          </p:cNvSpPr>
+          <p:nvPr>
+            <p:ph type="sldNum" sz="quarter" idx="5"/>
+          </p:nvPr>
+        </p:nvSpPr>
+        <p:spPr/>
+        <p:txBody>
+          <a:bodyPr/>
+          <a:lstStyle/>
+          <a:p>
+            <a:fld id="{7FE466A1-AB78-4968-BEFB-E93872E40569}" type="slidenum">
+              <a:rPr lang="en-US" smtClean="0"/>
+              <a:t>8</a:t>
+            </a:fld>
+            <a:endParaRPr lang="en-US"/>
+          </a:p>
+        </p:txBody>
+      </p:sp>
+    </p:spTree>
+    <p:extLst>
+      <p:ext uri="{BB962C8B-B14F-4D97-AF65-F5344CB8AC3E}">
+        <p14:creationId xmlns:p14="http://schemas.microsoft.com/office/powerpoint/2010/main" val="8346864"/>
+      </p:ext>
+    </p:extLst>
+  </p:cSld>
+  <p:clrMapOvr>
+    <a:masterClrMapping/>
+  </p:clrMapOvr>
+</p:notes>
+</file>
+
 <file path=ppt/slideLayouts/slideLayout1.xml><?xml version="1.0" encoding="utf-8"?>
 <p:sldLayout xmlns:a="http://schemas.openxmlformats.org/drawingml/2006/main" xmlns:r="http://schemas.openxmlformats.org/officeDocument/2006/relationships" xmlns:p="http://schemas.openxmlformats.org/presentationml/2006/main" type="title" preserve="1">
   <p:cSld name="Титульный слайд">
@@ -1954,7 +2042,7 @@
           <a:p>
             <a:fld id="{679D33B1-6C88-4DB6-8F59-77EBF0001DE5}" type="datetimeFigureOut">
               <a:rPr lang="en-US" smtClean="0"/>
-              <a:t>2019-02-01</a:t>
+              <a:t>2019-02-17</a:t>
             </a:fld>
             <a:endParaRPr lang="en-US"/>
           </a:p>
@@ -2864,7 +2952,7 @@
           <a:p>
             <a:fld id="{679D33B1-6C88-4DB6-8F59-77EBF0001DE5}" type="datetimeFigureOut">
               <a:rPr lang="en-US" smtClean="0"/>
-              <a:t>2019-02-01</a:t>
+              <a:t>2019-02-17</a:t>
             </a:fld>
             <a:endParaRPr lang="en-US"/>
           </a:p>
@@ -3170,7 +3258,7 @@
           <a:p>
             <a:fld id="{679D33B1-6C88-4DB6-8F59-77EBF0001DE5}" type="datetimeFigureOut">
               <a:rPr lang="en-US" smtClean="0"/>
-              <a:t>2019-02-01</a:t>
+              <a:t>2019-02-17</a:t>
             </a:fld>
             <a:endParaRPr lang="en-US"/>
           </a:p>
@@ -3556,7 +3644,7 @@
           <a:p>
             <a:fld id="{679D33B1-6C88-4DB6-8F59-77EBF0001DE5}" type="datetimeFigureOut">
               <a:rPr lang="en-US" smtClean="0"/>
-              <a:t>2019-02-01</a:t>
+              <a:t>2019-02-17</a:t>
             </a:fld>
             <a:endParaRPr lang="en-US"/>
           </a:p>
@@ -3929,7 +4017,7 @@
           <a:p>
             <a:fld id="{679D33B1-6C88-4DB6-8F59-77EBF0001DE5}" type="datetimeFigureOut">
               <a:rPr lang="en-US" smtClean="0"/>
-              <a:t>2019-02-01</a:t>
+              <a:t>2019-02-17</a:t>
             </a:fld>
             <a:endParaRPr lang="en-US"/>
           </a:p>
@@ -4432,7 +4520,7 @@
           <a:p>
             <a:fld id="{679D33B1-6C88-4DB6-8F59-77EBF0001DE5}" type="datetimeFigureOut">
               <a:rPr lang="en-US" smtClean="0"/>
-              <a:t>2019-02-01</a:t>
+              <a:t>2019-02-17</a:t>
             </a:fld>
             <a:endParaRPr lang="en-US"/>
           </a:p>
@@ -4686,7 +4774,7 @@
           <a:p>
             <a:fld id="{679D33B1-6C88-4DB6-8F59-77EBF0001DE5}" type="datetimeFigureOut">
               <a:rPr lang="en-US" smtClean="0"/>
-              <a:t>2019-02-01</a:t>
+              <a:t>2019-02-17</a:t>
             </a:fld>
             <a:endParaRPr lang="en-US"/>
           </a:p>
@@ -4849,7 +4937,7 @@
           <a:p>
             <a:fld id="{679D33B1-6C88-4DB6-8F59-77EBF0001DE5}" type="datetimeFigureOut">
               <a:rPr lang="en-US" smtClean="0"/>
-              <a:t>2019-02-01</a:t>
+              <a:t>2019-02-17</a:t>
             </a:fld>
             <a:endParaRPr lang="en-US"/>
           </a:p>
@@ -5236,7 +5324,7 @@
           <a:p>
             <a:fld id="{679D33B1-6C88-4DB6-8F59-77EBF0001DE5}" type="datetimeFigureOut">
               <a:rPr lang="en-US" smtClean="0"/>
-              <a:t>2019-02-01</a:t>
+              <a:t>2019-02-17</a:t>
             </a:fld>
             <a:endParaRPr lang="en-US"/>
           </a:p>
@@ -5642,7 +5730,7 @@
           <a:p>
             <a:fld id="{679D33B1-6C88-4DB6-8F59-77EBF0001DE5}" type="datetimeFigureOut">
               <a:rPr lang="en-US" smtClean="0"/>
-              <a:t>2019-02-01</a:t>
+              <a:t>2019-02-17</a:t>
             </a:fld>
             <a:endParaRPr lang="en-US"/>
           </a:p>
@@ -5855,7 +5943,7 @@
           <a:p>
             <a:fld id="{679D33B1-6C88-4DB6-8F59-77EBF0001DE5}" type="datetimeFigureOut">
               <a:rPr lang="en-US" smtClean="0"/>
-              <a:t>2019-02-01</a:t>
+              <a:t>2019-02-17</a:t>
             </a:fld>
             <a:endParaRPr lang="en-US"/>
           </a:p>
@@ -6692,6 +6780,633 @@
           <a:p>
             <a:r>
               <a:rPr lang="ru-RU" b="1" dirty="0"/>
+              <a:t>Принцип открытости/закрытости</a:t>
+            </a:r>
+            <a:br>
+              <a:rPr lang="en-US" b="1" dirty="0"/>
+            </a:br>
+            <a:r>
+              <a:rPr lang="en-US" sz="3200" i="1" dirty="0"/>
+              <a:t>The Open Closed Principle</a:t>
+            </a:r>
+            <a:endParaRPr lang="en-US" dirty="0"/>
+          </a:p>
+        </p:txBody>
+      </p:sp>
+      <p:sp>
+        <p:nvSpPr>
+          <p:cNvPr id="3" name="TextBox 2">
+            <a:extLst>
+              <a:ext uri="{FF2B5EF4-FFF2-40B4-BE49-F238E27FC236}">
+                <a16:creationId xmlns:a16="http://schemas.microsoft.com/office/drawing/2014/main" id="{0449A707-99AE-4210-AF89-4A9F25E03165}"/>
+              </a:ext>
+            </a:extLst>
+          </p:cNvPr>
+          <p:cNvSpPr txBox="1"/>
+          <p:nvPr/>
+        </p:nvSpPr>
+        <p:spPr>
+          <a:xfrm>
+            <a:off x="576263" y="2233613"/>
+            <a:ext cx="5942270" cy="3108543"/>
+          </a:xfrm>
+          <a:prstGeom prst="rect">
+            <a:avLst/>
+          </a:prstGeom>
+          <a:noFill/>
+        </p:spPr>
+        <p:txBody>
+          <a:bodyPr wrap="square" rtlCol="0">
+            <a:spAutoFit/>
+          </a:bodyPr>
+          <a:lstStyle/>
+          <a:p>
+            <a:r>
+              <a:rPr lang="en-US" sz="2800" dirty="0" err="1">
+                <a:solidFill>
+                  <a:srgbClr val="FFFF00"/>
+                </a:solidFill>
+              </a:rPr>
+              <a:t>Nuget</a:t>
+            </a:r>
+            <a:r>
+              <a:rPr lang="en-US" sz="2800" dirty="0">
+                <a:solidFill>
+                  <a:srgbClr val="FFFF00"/>
+                </a:solidFill>
+              </a:rPr>
+              <a:t>-packages</a:t>
+            </a:r>
+            <a:endParaRPr lang="ru-RU" sz="2800" dirty="0">
+              <a:solidFill>
+                <a:srgbClr val="FFFF00"/>
+              </a:solidFill>
+            </a:endParaRPr>
+          </a:p>
+          <a:p>
+            <a:endParaRPr lang="ru-RU" sz="2800" dirty="0"/>
+          </a:p>
+          <a:p>
+            <a:r>
+              <a:rPr lang="ru-RU" sz="2000" dirty="0"/>
+              <a:t>Хорошим примеров описываемого принципа может послужить свободно распространяемы сборки с сайта </a:t>
+            </a:r>
+            <a:r>
+              <a:rPr lang="en-US" sz="2000" b="1" dirty="0"/>
+              <a:t>nuget.org</a:t>
+            </a:r>
+          </a:p>
+          <a:p>
+            <a:endParaRPr lang="en-US" sz="2000" b="1" dirty="0"/>
+          </a:p>
+          <a:p>
+            <a:r>
+              <a:rPr lang="ru-RU" sz="2000" dirty="0"/>
+              <a:t>В демонстрации я хочу показать как оптимизировать код, полагаясь на работу принципа </a:t>
+            </a:r>
+            <a:r>
+              <a:rPr lang="en-US" sz="2000" dirty="0"/>
+              <a:t>Open/Closed</a:t>
+            </a:r>
+          </a:p>
+        </p:txBody>
+      </p:sp>
+      <p:pic>
+        <p:nvPicPr>
+          <p:cNvPr id="2" name="Рисунок 1">
+            <a:extLst>
+              <a:ext uri="{FF2B5EF4-FFF2-40B4-BE49-F238E27FC236}">
+                <a16:creationId xmlns:a16="http://schemas.microsoft.com/office/drawing/2014/main" id="{C2DCA1E8-B7BA-493E-90DE-9F0421F153A2}"/>
+              </a:ext>
+            </a:extLst>
+          </p:cNvPr>
+          <p:cNvPicPr>
+            <a:picLocks noChangeAspect="1"/>
+          </p:cNvPicPr>
+          <p:nvPr/>
+        </p:nvPicPr>
+        <p:blipFill>
+          <a:blip r:embed="rId2"/>
+          <a:stretch>
+            <a:fillRect/>
+          </a:stretch>
+        </p:blipFill>
+        <p:spPr>
+          <a:xfrm>
+            <a:off x="6518533" y="2233614"/>
+            <a:ext cx="3921737" cy="3288822"/>
+          </a:xfrm>
+          <a:prstGeom prst="rect">
+            <a:avLst/>
+          </a:prstGeom>
+        </p:spPr>
+      </p:pic>
+    </p:spTree>
+    <p:extLst>
+      <p:ext uri="{BB962C8B-B14F-4D97-AF65-F5344CB8AC3E}">
+        <p14:creationId xmlns:p14="http://schemas.microsoft.com/office/powerpoint/2010/main" val="1972228375"/>
+      </p:ext>
+    </p:extLst>
+  </p:cSld>
+  <p:clrMapOvr>
+    <a:masterClrMapping/>
+  </p:clrMapOvr>
+  <p:transition spd="slow">
+    <p:cover/>
+  </p:transition>
+</p:sld>
+</file>
+
+<file path=ppt/slides/slide11.xml><?xml version="1.0" encoding="utf-8"?>
+<p:sld xmlns:a="http://schemas.openxmlformats.org/drawingml/2006/main" xmlns:r="http://schemas.openxmlformats.org/officeDocument/2006/relationships" xmlns:p="http://schemas.openxmlformats.org/presentationml/2006/main">
+  <p:cSld>
+    <p:spTree>
+      <p:nvGrpSpPr>
+        <p:cNvPr id="1" name=""/>
+        <p:cNvGrpSpPr/>
+        <p:nvPr/>
+      </p:nvGrpSpPr>
+      <p:grpSpPr>
+        <a:xfrm>
+          <a:off x="0" y="0"/>
+          <a:ext cx="0" cy="0"/>
+          <a:chOff x="0" y="0"/>
+          <a:chExt cx="0" cy="0"/>
+        </a:xfrm>
+      </p:grpSpPr>
+      <p:sp>
+        <p:nvSpPr>
+          <p:cNvPr id="4" name="Заголовок 3">
+            <a:extLst>
+              <a:ext uri="{FF2B5EF4-FFF2-40B4-BE49-F238E27FC236}">
+                <a16:creationId xmlns:a16="http://schemas.microsoft.com/office/drawing/2014/main" id="{56B210DD-3C70-4225-BAC0-26F0709D6072}"/>
+              </a:ext>
+            </a:extLst>
+          </p:cNvPr>
+          <p:cNvSpPr>
+            <a:spLocks noGrp="1"/>
+          </p:cNvSpPr>
+          <p:nvPr>
+            <p:ph type="title"/>
+          </p:nvPr>
+        </p:nvSpPr>
+        <p:spPr/>
+        <p:txBody>
+          <a:bodyPr>
+            <a:normAutofit/>
+          </a:bodyPr>
+          <a:lstStyle/>
+          <a:p>
+            <a:r>
+              <a:rPr lang="ru-RU" b="1" dirty="0"/>
+              <a:t>Принцип открытости/закрытости</a:t>
+            </a:r>
+            <a:br>
+              <a:rPr lang="en-US" b="1" dirty="0"/>
+            </a:br>
+            <a:r>
+              <a:rPr lang="en-US" sz="3200" i="1" dirty="0"/>
+              <a:t>The Open Closed Principle</a:t>
+            </a:r>
+            <a:endParaRPr lang="en-US" dirty="0"/>
+          </a:p>
+        </p:txBody>
+      </p:sp>
+      <p:sp>
+        <p:nvSpPr>
+          <p:cNvPr id="3" name="TextBox 2">
+            <a:extLst>
+              <a:ext uri="{FF2B5EF4-FFF2-40B4-BE49-F238E27FC236}">
+                <a16:creationId xmlns:a16="http://schemas.microsoft.com/office/drawing/2014/main" id="{0449A707-99AE-4210-AF89-4A9F25E03165}"/>
+              </a:ext>
+            </a:extLst>
+          </p:cNvPr>
+          <p:cNvSpPr txBox="1"/>
+          <p:nvPr/>
+        </p:nvSpPr>
+        <p:spPr>
+          <a:xfrm>
+            <a:off x="598785" y="3251615"/>
+            <a:ext cx="9836982" cy="1015663"/>
+          </a:xfrm>
+          <a:prstGeom prst="rect">
+            <a:avLst/>
+          </a:prstGeom>
+          <a:noFill/>
+        </p:spPr>
+        <p:txBody>
+          <a:bodyPr wrap="square" rtlCol="0">
+            <a:spAutoFit/>
+          </a:bodyPr>
+          <a:lstStyle/>
+          <a:p>
+            <a:pPr algn="ctr"/>
+            <a:r>
+              <a:rPr lang="ru-RU" sz="6000" dirty="0">
+                <a:solidFill>
+                  <a:srgbClr val="FFFF00"/>
+                </a:solidFill>
+              </a:rPr>
+              <a:t>Демонстрация</a:t>
+            </a:r>
+            <a:endParaRPr lang="en-US" sz="6000" dirty="0"/>
+          </a:p>
+        </p:txBody>
+      </p:sp>
+    </p:spTree>
+    <p:extLst>
+      <p:ext uri="{BB962C8B-B14F-4D97-AF65-F5344CB8AC3E}">
+        <p14:creationId xmlns:p14="http://schemas.microsoft.com/office/powerpoint/2010/main" val="1545914933"/>
+      </p:ext>
+    </p:extLst>
+  </p:cSld>
+  <p:clrMapOvr>
+    <a:masterClrMapping/>
+  </p:clrMapOvr>
+  <p:transition spd="slow">
+    <p:cover/>
+  </p:transition>
+</p:sld>
+</file>
+
+<file path=ppt/slides/slide12.xml><?xml version="1.0" encoding="utf-8"?>
+<p:sld xmlns:a="http://schemas.openxmlformats.org/drawingml/2006/main" xmlns:r="http://schemas.openxmlformats.org/officeDocument/2006/relationships" xmlns:p="http://schemas.openxmlformats.org/presentationml/2006/main">
+  <p:cSld>
+    <p:spTree>
+      <p:nvGrpSpPr>
+        <p:cNvPr id="1" name=""/>
+        <p:cNvGrpSpPr/>
+        <p:nvPr/>
+      </p:nvGrpSpPr>
+      <p:grpSpPr>
+        <a:xfrm>
+          <a:off x="0" y="0"/>
+          <a:ext cx="0" cy="0"/>
+          <a:chOff x="0" y="0"/>
+          <a:chExt cx="0" cy="0"/>
+        </a:xfrm>
+      </p:grpSpPr>
+      <p:sp>
+        <p:nvSpPr>
+          <p:cNvPr id="4" name="Заголовок 3">
+            <a:extLst>
+              <a:ext uri="{FF2B5EF4-FFF2-40B4-BE49-F238E27FC236}">
+                <a16:creationId xmlns:a16="http://schemas.microsoft.com/office/drawing/2014/main" id="{56B210DD-3C70-4225-BAC0-26F0709D6072}"/>
+              </a:ext>
+            </a:extLst>
+          </p:cNvPr>
+          <p:cNvSpPr>
+            <a:spLocks noGrp="1"/>
+          </p:cNvSpPr>
+          <p:nvPr>
+            <p:ph type="title"/>
+          </p:nvPr>
+        </p:nvSpPr>
+        <p:spPr/>
+        <p:txBody>
+          <a:bodyPr>
+            <a:normAutofit/>
+          </a:bodyPr>
+          <a:lstStyle/>
+          <a:p>
+            <a:r>
+              <a:rPr lang="ru-RU" b="1" dirty="0"/>
+              <a:t>Принцип открытости/закрытости</a:t>
+            </a:r>
+            <a:br>
+              <a:rPr lang="en-US" b="1" dirty="0"/>
+            </a:br>
+            <a:r>
+              <a:rPr lang="en-US" sz="3200" i="1" dirty="0"/>
+              <a:t>The Open Closed Principle</a:t>
+            </a:r>
+            <a:endParaRPr lang="en-US" dirty="0"/>
+          </a:p>
+        </p:txBody>
+      </p:sp>
+      <p:sp>
+        <p:nvSpPr>
+          <p:cNvPr id="3" name="TextBox 2">
+            <a:extLst>
+              <a:ext uri="{FF2B5EF4-FFF2-40B4-BE49-F238E27FC236}">
+                <a16:creationId xmlns:a16="http://schemas.microsoft.com/office/drawing/2014/main" id="{0449A707-99AE-4210-AF89-4A9F25E03165}"/>
+              </a:ext>
+            </a:extLst>
+          </p:cNvPr>
+          <p:cNvSpPr txBox="1"/>
+          <p:nvPr/>
+        </p:nvSpPr>
+        <p:spPr>
+          <a:xfrm>
+            <a:off x="576263" y="2233613"/>
+            <a:ext cx="9836982" cy="2800767"/>
+          </a:xfrm>
+          <a:prstGeom prst="rect">
+            <a:avLst/>
+          </a:prstGeom>
+          <a:noFill/>
+        </p:spPr>
+        <p:txBody>
+          <a:bodyPr wrap="square" rtlCol="0">
+            <a:spAutoFit/>
+          </a:bodyPr>
+          <a:lstStyle/>
+          <a:p>
+            <a:r>
+              <a:rPr lang="en-US" sz="2800" dirty="0" err="1">
+                <a:solidFill>
+                  <a:srgbClr val="FFFF00"/>
+                </a:solidFill>
+              </a:rPr>
+              <a:t>Nuget</a:t>
+            </a:r>
+            <a:r>
+              <a:rPr lang="en-US" sz="2800" dirty="0">
+                <a:solidFill>
+                  <a:srgbClr val="FFFF00"/>
+                </a:solidFill>
+              </a:rPr>
+              <a:t>-package </a:t>
+            </a:r>
+            <a:r>
+              <a:rPr lang="ru-RU" sz="2800" dirty="0">
+                <a:solidFill>
+                  <a:srgbClr val="FFFF00"/>
+                </a:solidFill>
+              </a:rPr>
+              <a:t>(обособленная сборка)</a:t>
+            </a:r>
+          </a:p>
+          <a:p>
+            <a:endParaRPr lang="ru-RU" sz="2800" dirty="0"/>
+          </a:p>
+          <a:p>
+            <a:pPr marL="342900" indent="-342900">
+              <a:buFont typeface="Arial" panose="020B0604020202020204" pitchFamily="34" charset="0"/>
+              <a:buChar char="•"/>
+            </a:pPr>
+            <a:r>
+              <a:rPr lang="ru-RU" sz="2000" dirty="0"/>
+              <a:t>Вы можете установить разные </a:t>
+            </a:r>
+            <a:r>
+              <a:rPr lang="en-US" sz="2000" dirty="0" err="1"/>
+              <a:t>nuget</a:t>
+            </a:r>
+            <a:r>
+              <a:rPr lang="en-US" sz="2000" dirty="0"/>
+              <a:t>-</a:t>
+            </a:r>
+            <a:r>
+              <a:rPr lang="ru-RU" sz="2000" dirty="0"/>
+              <a:t>пакеты в разные проекты и даже в разные платформы.</a:t>
+            </a:r>
+          </a:p>
+          <a:p>
+            <a:pPr marL="342900" indent="-342900">
+              <a:buFont typeface="Arial" panose="020B0604020202020204" pitchFamily="34" charset="0"/>
+              <a:buChar char="•"/>
+            </a:pPr>
+            <a:r>
+              <a:rPr lang="ru-RU" sz="2000" dirty="0"/>
+              <a:t>При этом менять сами </a:t>
+            </a:r>
+            <a:r>
+              <a:rPr lang="en-US" sz="2000" dirty="0" err="1"/>
+              <a:t>nuget</a:t>
+            </a:r>
+            <a:r>
+              <a:rPr lang="en-US" sz="2000" dirty="0"/>
+              <a:t>-</a:t>
+            </a:r>
+            <a:r>
+              <a:rPr lang="ru-RU" sz="2000" dirty="0"/>
+              <a:t>пакеты (вернее сборки лежащие в них) вам не требуется. </a:t>
+            </a:r>
+          </a:p>
+          <a:p>
+            <a:pPr marL="342900" indent="-342900">
+              <a:buFont typeface="Arial" panose="020B0604020202020204" pitchFamily="34" charset="0"/>
+              <a:buChar char="•"/>
+            </a:pPr>
+            <a:r>
+              <a:rPr lang="ru-RU" sz="2000" dirty="0"/>
+              <a:t>Вы можете использовать уже реализованный функционал и даже дополнить своими поведениями существующие сущности.</a:t>
+            </a:r>
+            <a:endParaRPr lang="en-US" sz="2000" dirty="0"/>
+          </a:p>
+        </p:txBody>
+      </p:sp>
+    </p:spTree>
+    <p:extLst>
+      <p:ext uri="{BB962C8B-B14F-4D97-AF65-F5344CB8AC3E}">
+        <p14:creationId xmlns:p14="http://schemas.microsoft.com/office/powerpoint/2010/main" val="319976170"/>
+      </p:ext>
+    </p:extLst>
+  </p:cSld>
+  <p:clrMapOvr>
+    <a:masterClrMapping/>
+  </p:clrMapOvr>
+  <p:transition spd="slow">
+    <p:cover/>
+  </p:transition>
+</p:sld>
+</file>
+
+<file path=ppt/slides/slide13.xml><?xml version="1.0" encoding="utf-8"?>
+<p:sld xmlns:a="http://schemas.openxmlformats.org/drawingml/2006/main" xmlns:r="http://schemas.openxmlformats.org/officeDocument/2006/relationships" xmlns:p="http://schemas.openxmlformats.org/presentationml/2006/main">
+  <p:cSld>
+    <p:spTree>
+      <p:nvGrpSpPr>
+        <p:cNvPr id="1" name=""/>
+        <p:cNvGrpSpPr/>
+        <p:nvPr/>
+      </p:nvGrpSpPr>
+      <p:grpSpPr>
+        <a:xfrm>
+          <a:off x="0" y="0"/>
+          <a:ext cx="0" cy="0"/>
+          <a:chOff x="0" y="0"/>
+          <a:chExt cx="0" cy="0"/>
+        </a:xfrm>
+      </p:grpSpPr>
+      <p:sp>
+        <p:nvSpPr>
+          <p:cNvPr id="4" name="Заголовок 3">
+            <a:extLst>
+              <a:ext uri="{FF2B5EF4-FFF2-40B4-BE49-F238E27FC236}">
+                <a16:creationId xmlns:a16="http://schemas.microsoft.com/office/drawing/2014/main" id="{56B210DD-3C70-4225-BAC0-26F0709D6072}"/>
+              </a:ext>
+            </a:extLst>
+          </p:cNvPr>
+          <p:cNvSpPr>
+            <a:spLocks noGrp="1"/>
+          </p:cNvSpPr>
+          <p:nvPr>
+            <p:ph type="title"/>
+          </p:nvPr>
+        </p:nvSpPr>
+        <p:spPr/>
+        <p:txBody>
+          <a:bodyPr>
+            <a:normAutofit/>
+          </a:bodyPr>
+          <a:lstStyle/>
+          <a:p>
+            <a:r>
+              <a:rPr lang="ru-RU" b="1" dirty="0"/>
+              <a:t>Принцип подстановки Барбары Лисков</a:t>
+            </a:r>
+            <a:br>
+              <a:rPr lang="en-US" b="1" dirty="0"/>
+            </a:br>
+            <a:r>
+              <a:rPr lang="en-US" sz="3200" i="1" dirty="0"/>
+              <a:t>The </a:t>
+            </a:r>
+            <a:r>
+              <a:rPr lang="en-US" sz="3200" i="1" dirty="0" err="1"/>
+              <a:t>Liskov</a:t>
+            </a:r>
+            <a:r>
+              <a:rPr lang="en-US" sz="3200" i="1" dirty="0"/>
+              <a:t> Substitution Principle</a:t>
+            </a:r>
+            <a:endParaRPr lang="en-US" dirty="0"/>
+          </a:p>
+        </p:txBody>
+      </p:sp>
+      <p:sp>
+        <p:nvSpPr>
+          <p:cNvPr id="3" name="TextBox 2">
+            <a:extLst>
+              <a:ext uri="{FF2B5EF4-FFF2-40B4-BE49-F238E27FC236}">
+                <a16:creationId xmlns:a16="http://schemas.microsoft.com/office/drawing/2014/main" id="{3089AEBE-4865-4BB1-9F1D-1582A462A55C}"/>
+              </a:ext>
+            </a:extLst>
+          </p:cNvPr>
+          <p:cNvSpPr txBox="1"/>
+          <p:nvPr/>
+        </p:nvSpPr>
+        <p:spPr>
+          <a:xfrm>
+            <a:off x="576263" y="2233613"/>
+            <a:ext cx="9836982" cy="3354765"/>
+          </a:xfrm>
+          <a:prstGeom prst="rect">
+            <a:avLst/>
+          </a:prstGeom>
+          <a:noFill/>
+        </p:spPr>
+        <p:txBody>
+          <a:bodyPr wrap="square" rtlCol="0">
+            <a:spAutoFit/>
+          </a:bodyPr>
+          <a:lstStyle/>
+          <a:p>
+            <a:r>
+              <a:rPr lang="ru-RU" sz="2800" dirty="0">
+                <a:solidFill>
+                  <a:srgbClr val="FFFF00"/>
+                </a:solidFill>
+              </a:rPr>
+              <a:t>Объекты в программе должны быть заменяемыми на экземпляры их подтипов без изменения правильности выполнения программы.</a:t>
+            </a:r>
+          </a:p>
+          <a:p>
+            <a:endParaRPr lang="ru-RU" sz="2800" dirty="0"/>
+          </a:p>
+          <a:p>
+            <a:r>
+              <a:rPr lang="ru-RU" sz="2000" dirty="0"/>
+              <a:t>Принцип подстановки Барбары Лисков (англ. </a:t>
+            </a:r>
+            <a:r>
+              <a:rPr lang="ru-RU" sz="2000" dirty="0" err="1"/>
+              <a:t>Liskov</a:t>
+            </a:r>
+            <a:r>
+              <a:rPr lang="ru-RU" sz="2000" dirty="0"/>
+              <a:t> </a:t>
+            </a:r>
+            <a:r>
+              <a:rPr lang="ru-RU" sz="2000" dirty="0" err="1"/>
+              <a:t>Substitution</a:t>
+            </a:r>
+            <a:r>
+              <a:rPr lang="ru-RU" sz="2000" dirty="0"/>
+              <a:t> </a:t>
+            </a:r>
+            <a:r>
+              <a:rPr lang="ru-RU" sz="2000" dirty="0" err="1"/>
+              <a:t>Principle</a:t>
+            </a:r>
+            <a:r>
+              <a:rPr lang="ru-RU" sz="2000" dirty="0"/>
+              <a:t>, LSP) в объектно-ориентированном программировании является специфичным определением подтипа, предложенным Барбарой Лисков в 1987 году на конференции в основном докладе под названием Абстракция данных и иерархия.</a:t>
+            </a:r>
+            <a:endParaRPr lang="en-US" sz="2000" dirty="0"/>
+          </a:p>
+        </p:txBody>
+      </p:sp>
+    </p:spTree>
+    <p:extLst>
+      <p:ext uri="{BB962C8B-B14F-4D97-AF65-F5344CB8AC3E}">
+        <p14:creationId xmlns:p14="http://schemas.microsoft.com/office/powerpoint/2010/main" val="3989441364"/>
+      </p:ext>
+    </p:extLst>
+  </p:cSld>
+  <p:clrMapOvr>
+    <a:masterClrMapping/>
+  </p:clrMapOvr>
+  <p:transition spd="slow">
+    <p:cover/>
+  </p:transition>
+</p:sld>
+</file>
+
+<file path=ppt/slides/slide14.xml><?xml version="1.0" encoding="utf-8"?>
+<p:sld xmlns:a="http://schemas.openxmlformats.org/drawingml/2006/main" xmlns:r="http://schemas.openxmlformats.org/officeDocument/2006/relationships" xmlns:p="http://schemas.openxmlformats.org/presentationml/2006/main">
+  <p:cSld>
+    <p:spTree>
+      <p:nvGrpSpPr>
+        <p:cNvPr id="1" name=""/>
+        <p:cNvGrpSpPr/>
+        <p:nvPr/>
+      </p:nvGrpSpPr>
+      <p:grpSpPr>
+        <a:xfrm>
+          <a:off x="0" y="0"/>
+          <a:ext cx="0" cy="0"/>
+          <a:chOff x="0" y="0"/>
+          <a:chExt cx="0" cy="0"/>
+        </a:xfrm>
+      </p:grpSpPr>
+      <p:sp>
+        <p:nvSpPr>
+          <p:cNvPr id="4" name="Заголовок 3">
+            <a:extLst>
+              <a:ext uri="{FF2B5EF4-FFF2-40B4-BE49-F238E27FC236}">
+                <a16:creationId xmlns:a16="http://schemas.microsoft.com/office/drawing/2014/main" id="{56B210DD-3C70-4225-BAC0-26F0709D6072}"/>
+              </a:ext>
+            </a:extLst>
+          </p:cNvPr>
+          <p:cNvSpPr>
+            <a:spLocks noGrp="1"/>
+          </p:cNvSpPr>
+          <p:nvPr>
+            <p:ph type="title"/>
+          </p:nvPr>
+        </p:nvSpPr>
+        <p:spPr/>
+        <p:txBody>
+          <a:bodyPr>
+            <a:normAutofit/>
+          </a:bodyPr>
+          <a:lstStyle/>
+          <a:p>
+            <a:r>
+              <a:rPr lang="ru-RU" b="1" dirty="0"/>
               <a:t>Принцип разделения интерфейса</a:t>
             </a:r>
             <a:br>
@@ -6794,7 +7509,7 @@
 </p:sld>
 </file>
 
-<file path=ppt/slides/slide11.xml><?xml version="1.0" encoding="utf-8"?>
+<file path=ppt/slides/slide15.xml><?xml version="1.0" encoding="utf-8"?>
 <p:sld xmlns:a="http://schemas.openxmlformats.org/drawingml/2006/main" xmlns:r="http://schemas.openxmlformats.org/officeDocument/2006/relationships" xmlns:p="http://schemas.openxmlformats.org/presentationml/2006/main">
   <p:cSld>
     <p:spTree>
@@ -8417,37 +9132,58 @@
       </p:grpSpPr>
       <p:sp>
         <p:nvSpPr>
-          <p:cNvPr id="4" name="Заголовок 3">
-            <a:extLst>
-              <a:ext uri="{FF2B5EF4-FFF2-40B4-BE49-F238E27FC236}">
-                <a16:creationId xmlns:a16="http://schemas.microsoft.com/office/drawing/2014/main" id="{56B210DD-3C70-4225-BAC0-26F0709D6072}"/>
-              </a:ext>
-            </a:extLst>
-          </p:cNvPr>
-          <p:cNvSpPr>
-            <a:spLocks noGrp="1"/>
-          </p:cNvSpPr>
-          <p:nvPr>
-            <p:ph type="title"/>
+          <p:cNvPr id="2" name="Заголовок 1"/>
+          <p:cNvSpPr>
+            <a:spLocks noGrp="1"/>
+          </p:cNvSpPr>
+          <p:nvPr>
+            <p:ph type="ctrTitle"/>
           </p:nvPr>
         </p:nvSpPr>
         <p:spPr/>
         <p:txBody>
-          <a:bodyPr>
-            <a:normAutofit/>
-          </a:bodyPr>
+          <a:bodyPr/>
           <a:lstStyle/>
           <a:p>
             <a:r>
-              <a:rPr lang="ru-RU" b="1" dirty="0"/>
-              <a:t>Принцип открытости/закрытости</a:t>
-            </a:r>
-            <a:br>
-              <a:rPr lang="en-US" b="1" dirty="0"/>
-            </a:br>
-            <a:r>
-              <a:rPr lang="en-US" sz="3200" i="1" dirty="0"/>
-              <a:t>The Open Closed Principle</a:t>
+              <a:rPr lang="en-US" dirty="0"/>
+              <a:t>S</a:t>
+            </a:r>
+            <a:r>
+              <a:rPr lang="ru-RU" dirty="0"/>
+              <a:t>.</a:t>
+            </a:r>
+            <a:r>
+              <a:rPr lang="en-US" dirty="0"/>
+              <a:t>O</a:t>
+            </a:r>
+            <a:r>
+              <a:rPr lang="ru-RU" dirty="0"/>
+              <a:t>.</a:t>
+            </a:r>
+            <a:r>
+              <a:rPr lang="en-US" dirty="0"/>
+              <a:t>L</a:t>
+            </a:r>
+            <a:r>
+              <a:rPr lang="ru-RU" dirty="0"/>
+              <a:t>.</a:t>
+            </a:r>
+            <a:r>
+              <a:rPr lang="en-US" dirty="0"/>
+              <a:t>I</a:t>
+            </a:r>
+            <a:r>
+              <a:rPr lang="ru-RU" dirty="0"/>
+              <a:t>.</a:t>
+            </a:r>
+            <a:r>
+              <a:rPr lang="en-US" dirty="0"/>
+              <a:t>D</a:t>
+            </a:r>
+            <a:r>
+              <a:rPr lang="ru-RU" dirty="0"/>
+              <a:t>.</a:t>
             </a:r>
             <a:endParaRPr lang="en-US" dirty="0"/>
           </a:p>
@@ -8455,20 +9191,37 @@
       </p:sp>
       <p:sp>
         <p:nvSpPr>
-          <p:cNvPr id="3" name="TextBox 2">
-            <a:extLst>
-              <a:ext uri="{FF2B5EF4-FFF2-40B4-BE49-F238E27FC236}">
-                <a16:creationId xmlns:a16="http://schemas.microsoft.com/office/drawing/2014/main" id="{0449A707-99AE-4210-AF89-4A9F25E03165}"/>
-              </a:ext>
-            </a:extLst>
-          </p:cNvPr>
+          <p:cNvPr id="3" name="Подзаголовок 2"/>
+          <p:cNvSpPr>
+            <a:spLocks noGrp="1"/>
+          </p:cNvSpPr>
+          <p:nvPr>
+            <p:ph type="subTitle" idx="1"/>
+          </p:nvPr>
+        </p:nvSpPr>
+        <p:spPr/>
+        <p:txBody>
+          <a:bodyPr/>
+          <a:lstStyle/>
+          <a:p>
+            <a:r>
+              <a:rPr lang="ru-RU" sz="1800" dirty="0"/>
+              <a:t>Просто о сложном</a:t>
+            </a:r>
+            <a:endParaRPr lang="en-US" sz="1800" dirty="0"/>
+          </a:p>
+        </p:txBody>
+      </p:sp>
+      <p:sp>
+        <p:nvSpPr>
+          <p:cNvPr id="4" name="TextBox 3"/>
           <p:cNvSpPr txBox="1"/>
           <p:nvPr/>
         </p:nvSpPr>
         <p:spPr>
           <a:xfrm>
-            <a:off x="576263" y="2233613"/>
-            <a:ext cx="9836982" cy="2616101"/>
+            <a:off x="548668" y="2061549"/>
+            <a:ext cx="8275788" cy="369332"/>
           </a:xfrm>
           <a:prstGeom prst="rect">
             <a:avLst/>
@@ -8482,71 +9235,105 @@
           <a:lstStyle/>
           <a:p>
             <a:r>
-              <a:rPr lang="ru-RU" sz="2800" dirty="0">
-                <a:solidFill>
-                  <a:srgbClr val="FFFF00"/>
-                </a:solidFill>
-              </a:rPr>
-              <a:t>Программные сущности должны быть открыты для расширения, но закрыты для модификации.</a:t>
-            </a:r>
-          </a:p>
-          <a:p>
-            <a:endParaRPr lang="ru-RU" sz="2800" dirty="0"/>
-          </a:p>
-          <a:p>
-            <a:r>
-              <a:rPr lang="ru-RU" sz="2000" dirty="0"/>
-              <a:t>Принцип открытости/закрытости (англ. </a:t>
-            </a:r>
-            <a:r>
-              <a:rPr lang="ru-RU" sz="2000" dirty="0" err="1"/>
-              <a:t>The</a:t>
-            </a:r>
-            <a:r>
-              <a:rPr lang="ru-RU" sz="2000" dirty="0"/>
-              <a:t> </a:t>
-            </a:r>
-            <a:r>
-              <a:rPr lang="ru-RU" sz="2000" dirty="0" err="1"/>
-              <a:t>Open</a:t>
-            </a:r>
-            <a:r>
-              <a:rPr lang="ru-RU" sz="2000" dirty="0"/>
-              <a:t> </a:t>
-            </a:r>
-            <a:r>
-              <a:rPr lang="ru-RU" sz="2000" dirty="0" err="1"/>
-              <a:t>Closed</a:t>
-            </a:r>
-            <a:r>
-              <a:rPr lang="ru-RU" sz="2000" dirty="0"/>
-              <a:t> </a:t>
-            </a:r>
-            <a:r>
-              <a:rPr lang="ru-RU" sz="2000" dirty="0" err="1"/>
-              <a:t>Principle</a:t>
-            </a:r>
-            <a:r>
-              <a:rPr lang="ru-RU" sz="2000" dirty="0"/>
-              <a:t>, OCP) — принцип ООП, устанавливающий следующее положение: «программные сущности (классы, модули, функции и т. п.) должны быть открыты для расширения, но закрыты для изменения.</a:t>
-            </a:r>
-            <a:endParaRPr lang="en-US" sz="2000" dirty="0"/>
+              <a:rPr lang="ru-RU" dirty="0"/>
+              <a:t>Пять основных принципов объектно-ориентированного  программирования</a:t>
+            </a:r>
+            <a:endParaRPr lang="en-US" dirty="0"/>
           </a:p>
         </p:txBody>
       </p:sp>
     </p:spTree>
     <p:extLst>
       <p:ext uri="{BB962C8B-B14F-4D97-AF65-F5344CB8AC3E}">
-        <p14:creationId xmlns:p14="http://schemas.microsoft.com/office/powerpoint/2010/main" val="2724221835"/>
+        <p14:creationId xmlns:p14="http://schemas.microsoft.com/office/powerpoint/2010/main" val="2053258474"/>
       </p:ext>
     </p:extLst>
   </p:cSld>
   <p:clrMapOvr>
     <a:masterClrMapping/>
   </p:clrMapOvr>
-  <p:transition spd="slow">
-    <p:cover/>
-  </p:transition>
+  <p:timing>
+    <p:tnLst>
+      <p:par>
+        <p:cTn id="1" dur="indefinite" restart="never" nodeType="tmRoot">
+          <p:childTnLst>
+            <p:seq concurrent="1" nextAc="seek">
+              <p:cTn id="2" dur="indefinite" nodeType="mainSeq">
+                <p:childTnLst>
+                  <p:par>
+                    <p:cTn id="3" fill="hold">
+                      <p:stCondLst>
+                        <p:cond delay="indefinite"/>
+                      </p:stCondLst>
+                      <p:childTnLst>
+                        <p:par>
+                          <p:cTn id="4" fill="hold">
+                            <p:stCondLst>
+                              <p:cond delay="0"/>
+                            </p:stCondLst>
+                            <p:childTnLst>
+                              <p:par>
+                                <p:cTn id="5" presetID="1" presetClass="entr" presetSubtype="0" fill="hold" grpId="0" nodeType="clickEffect">
+                                  <p:stCondLst>
+                                    <p:cond delay="0"/>
+                                  </p:stCondLst>
+                                  <p:childTnLst>
+                                    <p:set>
+                                      <p:cBhvr>
+                                        <p:cTn id="6" dur="1" fill="hold">
+                                          <p:stCondLst>
+                                            <p:cond delay="0"/>
+                                          </p:stCondLst>
+                                        </p:cTn>
+                                        <p:tgtEl>
+                                          <p:spTgt spid="3">
+                                            <p:txEl>
+                                              <p:pRg st="0" end="0"/>
+                                            </p:txEl>
+                                          </p:spTgt>
+                                        </p:tgtEl>
+                                        <p:attrNameLst>
+                                          <p:attrName>style.visibility</p:attrName>
+                                        </p:attrNameLst>
+                                      </p:cBhvr>
+                                      <p:to>
+                                        <p:strVal val="visible"/>
+                                      </p:to>
+                                    </p:set>
+                                  </p:childTnLst>
+                                </p:cTn>
+                              </p:par>
+                            </p:childTnLst>
+                          </p:cTn>
+                        </p:par>
+                      </p:childTnLst>
+                    </p:cTn>
+                  </p:par>
+                </p:childTnLst>
+              </p:cTn>
+              <p:prevCondLst>
+                <p:cond evt="onPrev" delay="0">
+                  <p:tgtEl>
+                    <p:sldTgt/>
+                  </p:tgtEl>
+                </p:cond>
+              </p:prevCondLst>
+              <p:nextCondLst>
+                <p:cond evt="onNext" delay="0">
+                  <p:tgtEl>
+                    <p:sldTgt/>
+                  </p:tgtEl>
+                </p:cond>
+              </p:nextCondLst>
+            </p:seq>
+          </p:childTnLst>
+        </p:cTn>
+      </p:par>
+    </p:tnLst>
+    <p:bldLst>
+      <p:bldP spid="3" grpId="0" build="p"/>
+    </p:bldLst>
+  </p:timing>
 </p:sld>
 </file>
 
@@ -8592,22 +9379,14 @@
           <a:p>
             <a:r>
               <a:rPr lang="ru-RU" b="1" dirty="0"/>
-              <a:t>Принцип подстановки Барбары Лисков</a:t>
+              <a:t>Принцип открытости/закрытости</a:t>
             </a:r>
             <a:br>
               <a:rPr lang="en-US" b="1" dirty="0"/>
             </a:br>
             <a:r>
               <a:rPr lang="en-US" sz="3200" i="1" dirty="0"/>
-              <a:t>The </a:t>
-            </a:r>
-            <a:r>
-              <a:rPr lang="en-US" sz="3200" i="1" dirty="0" err="1"/>
-              <a:t>Liskov</a:t>
-            </a:r>
-            <a:r>
-              <a:rPr lang="en-US" sz="3200" i="1" dirty="0"/>
-              <a:t> Substitution Principle</a:t>
+              <a:t>The Open Closed Principle</a:t>
             </a:r>
             <a:endParaRPr lang="en-US" dirty="0"/>
           </a:p>
@@ -8618,7 +9397,7 @@
           <p:cNvPr id="3" name="TextBox 2">
             <a:extLst>
               <a:ext uri="{FF2B5EF4-FFF2-40B4-BE49-F238E27FC236}">
-                <a16:creationId xmlns:a16="http://schemas.microsoft.com/office/drawing/2014/main" id="{3089AEBE-4865-4BB1-9F1D-1582A462A55C}"/>
+                <a16:creationId xmlns:a16="http://schemas.microsoft.com/office/drawing/2014/main" id="{0449A707-99AE-4210-AF89-4A9F25E03165}"/>
               </a:ext>
             </a:extLst>
           </p:cNvPr>
@@ -8628,7 +9407,7 @@
         <p:spPr>
           <a:xfrm>
             <a:off x="576263" y="2233613"/>
-            <a:ext cx="9836982" cy="3354765"/>
+            <a:ext cx="9836982" cy="2616101"/>
           </a:xfrm>
           <a:prstGeom prst="rect">
             <a:avLst/>
@@ -8647,7 +9426,7 @@
                   <a:srgbClr val="FFFF00"/>
                 </a:solidFill>
               </a:rPr>
-              <a:t>Объекты в программе должны быть заменяемыми на экземпляры их подтипов без изменения правильности выполнения программы.</a:t>
+              <a:t>Программные сущности должны быть открыты для расширения, но закрыты для модификации.</a:t>
             </a:r>
           </a:p>
           <a:p>
@@ -8656,11 +9435,11 @@
           <a:p>
             <a:r>
               <a:rPr lang="ru-RU" sz="2000" dirty="0"/>
-              <a:t>Принцип подстановки Барбары Лисков (англ. </a:t>
+              <a:t>Принцип открытости/закрытости (англ. </a:t>
             </a:r>
             <a:r>
               <a:rPr lang="ru-RU" sz="2000" dirty="0" err="1"/>
-              <a:t>Liskov</a:t>
+              <a:t>The</a:t>
             </a:r>
             <a:r>
               <a:rPr lang="ru-RU" sz="2000" dirty="0"/>
@@ -8668,7 +9447,7 @@
             </a:r>
             <a:r>
               <a:rPr lang="ru-RU" sz="2000" dirty="0" err="1"/>
-              <a:t>Substitution</a:t>
+              <a:t>Open</a:t>
             </a:r>
             <a:r>
               <a:rPr lang="ru-RU" sz="2000" dirty="0"/>
@@ -8676,11 +9455,19 @@
             </a:r>
             <a:r>
               <a:rPr lang="ru-RU" sz="2000" dirty="0" err="1"/>
+              <a:t>Closed</a:t>
+            </a:r>
+            <a:r>
+              <a:rPr lang="ru-RU" sz="2000" dirty="0"/>
+              <a:t> </a:t>
+            </a:r>
+            <a:r>
+              <a:rPr lang="ru-RU" sz="2000" dirty="0" err="1"/>
               <a:t>Principle</a:t>
             </a:r>
             <a:r>
               <a:rPr lang="ru-RU" sz="2000" dirty="0"/>
-              <a:t>, LSP) в объектно-ориентированном программировании является специфичным определением подтипа, предложенным Барбарой Лисков в 1987 году на конференции в основном докладе под названием Абстракция данных и иерархия.</a:t>
+              <a:t>, OCP) — принцип ООП, устанавливающий следующее положение: «программные сущности (классы, модули, функции и т. п.) должны быть открыты для расширения, но закрыты для изменения.</a:t>
             </a:r>
             <a:endParaRPr lang="en-US" sz="2000" dirty="0"/>
           </a:p>
@@ -8689,7 +9476,7 @@
     </p:spTree>
     <p:extLst>
       <p:ext uri="{BB962C8B-B14F-4D97-AF65-F5344CB8AC3E}">
-        <p14:creationId xmlns:p14="http://schemas.microsoft.com/office/powerpoint/2010/main" val="3989441364"/>
+        <p14:creationId xmlns:p14="http://schemas.microsoft.com/office/powerpoint/2010/main" val="2724221835"/>
       </p:ext>
     </p:extLst>
   </p:cSld>

</xml_diff>